<commit_message>
updated powerpoint, add resource folder
</commit_message>
<xml_diff>
--- a/Lessons/Lesson1.pptx
+++ b/Lessons/Lesson1.pptx
@@ -8942,7 +8942,7 @@
           <a:p>
             <a:fld id="{D264E860-8F31-4054-A493-E34C98AAD2AE}" type="datetimeFigureOut">
               <a:rPr lang="en-US" smtClean="0"/>
-              <a:t>10/24/2018</a:t>
+              <a:t>10/31/2018</a:t>
             </a:fld>
             <a:endParaRPr lang="en-US"/>
           </a:p>
@@ -12301,7 +12301,7 @@
           <a:p>
             <a:fld id="{E7A722B3-22F4-4B05-8985-87A59CBAA03B}" type="datetimeFigureOut">
               <a:rPr lang="en-US" smtClean="0"/>
-              <a:t>10/24/2018</a:t>
+              <a:t>10/31/2018</a:t>
             </a:fld>
             <a:endParaRPr lang="en-US"/>
           </a:p>
@@ -12631,7 +12631,7 @@
           <a:p>
             <a:fld id="{E7A722B3-22F4-4B05-8985-87A59CBAA03B}" type="datetimeFigureOut">
               <a:rPr lang="en-US" smtClean="0"/>
-              <a:t>10/24/2018</a:t>
+              <a:t>10/31/2018</a:t>
             </a:fld>
             <a:endParaRPr lang="en-US"/>
           </a:p>
@@ -12811,7 +12811,7 @@
           <a:p>
             <a:fld id="{E7A722B3-22F4-4B05-8985-87A59CBAA03B}" type="datetimeFigureOut">
               <a:rPr lang="en-US" smtClean="0"/>
-              <a:t>10/24/2018</a:t>
+              <a:t>10/31/2018</a:t>
             </a:fld>
             <a:endParaRPr lang="en-US"/>
           </a:p>
@@ -12981,7 +12981,7 @@
           <a:p>
             <a:fld id="{E7A722B3-22F4-4B05-8985-87A59CBAA03B}" type="datetimeFigureOut">
               <a:rPr lang="en-US" smtClean="0"/>
-              <a:t>10/24/2018</a:t>
+              <a:t>10/31/2018</a:t>
             </a:fld>
             <a:endParaRPr lang="en-US"/>
           </a:p>
@@ -13258,7 +13258,7 @@
           <a:p>
             <a:fld id="{E7A722B3-22F4-4B05-8985-87A59CBAA03B}" type="datetimeFigureOut">
               <a:rPr lang="en-US" smtClean="0"/>
-              <a:t>10/24/2018</a:t>
+              <a:t>10/31/2018</a:t>
             </a:fld>
             <a:endParaRPr lang="en-US"/>
           </a:p>
@@ -13652,7 +13652,7 @@
           <a:p>
             <a:fld id="{E7A722B3-22F4-4B05-8985-87A59CBAA03B}" type="datetimeFigureOut">
               <a:rPr lang="en-US" smtClean="0"/>
-              <a:t>10/24/2018</a:t>
+              <a:t>10/31/2018</a:t>
             </a:fld>
             <a:endParaRPr lang="en-US"/>
           </a:p>
@@ -14129,7 +14129,7 @@
           <a:p>
             <a:fld id="{E7A722B3-22F4-4B05-8985-87A59CBAA03B}" type="datetimeFigureOut">
               <a:rPr lang="en-US" smtClean="0"/>
-              <a:t>10/24/2018</a:t>
+              <a:t>10/31/2018</a:t>
             </a:fld>
             <a:endParaRPr lang="en-US"/>
           </a:p>
@@ -14247,7 +14247,7 @@
           <a:p>
             <a:fld id="{E7A722B3-22F4-4B05-8985-87A59CBAA03B}" type="datetimeFigureOut">
               <a:rPr lang="en-US" smtClean="0"/>
-              <a:t>10/24/2018</a:t>
+              <a:t>10/31/2018</a:t>
             </a:fld>
             <a:endParaRPr lang="en-US"/>
           </a:p>
@@ -14342,7 +14342,7 @@
           <a:p>
             <a:fld id="{E7A722B3-22F4-4B05-8985-87A59CBAA03B}" type="datetimeFigureOut">
               <a:rPr lang="en-US" smtClean="0"/>
-              <a:t>10/24/2018</a:t>
+              <a:t>10/31/2018</a:t>
             </a:fld>
             <a:endParaRPr lang="en-US"/>
           </a:p>
@@ -14688,7 +14688,7 @@
           <a:p>
             <a:fld id="{E7A722B3-22F4-4B05-8985-87A59CBAA03B}" type="datetimeFigureOut">
               <a:rPr lang="en-US" smtClean="0"/>
-              <a:t>10/24/2018</a:t>
+              <a:t>10/31/2018</a:t>
             </a:fld>
             <a:endParaRPr lang="en-US"/>
           </a:p>
@@ -15076,7 +15076,7 @@
           <a:p>
             <a:fld id="{E7A722B3-22F4-4B05-8985-87A59CBAA03B}" type="datetimeFigureOut">
               <a:rPr lang="en-US" smtClean="0"/>
-              <a:t>10/24/2018</a:t>
+              <a:t>10/31/2018</a:t>
             </a:fld>
             <a:endParaRPr lang="en-US"/>
           </a:p>
@@ -15354,7 +15354,7 @@
           <a:p>
             <a:fld id="{E7A722B3-22F4-4B05-8985-87A59CBAA03B}" type="datetimeFigureOut">
               <a:rPr lang="en-US" smtClean="0"/>
-              <a:t>10/24/2018</a:t>
+              <a:t>10/31/2018</a:t>
             </a:fld>
             <a:endParaRPr lang="en-US"/>
           </a:p>
@@ -21130,27 +21130,37 @@
           </a:p>
           <a:p>
             <a:r>
-              <a:rPr lang="en-US" dirty="0"/>
-              <a:t>(maybe </a:t>
+              <a:rPr lang="en-US" dirty="0">
+                <a:hlinkClick r:id="rId3"/>
+              </a:rPr>
+              <a:t>https://github.com/akiljames83/MacAI-2018</a:t>
+            </a:r>
+            <a:endParaRPr lang="en-US" dirty="0"/>
+          </a:p>
+          <a:p>
+            <a:pPr lvl="1"/>
+            <a:r>
+              <a:rPr lang="en-US" dirty="0"/>
+              <a:t>Star the repo so you can easily access it</a:t>
+            </a:r>
+          </a:p>
+          <a:p>
+            <a:pPr lvl="1"/>
+            <a:r>
+              <a:rPr lang="en-US" dirty="0"/>
+              <a:t>Check it for updates and solutions to tutorial exercises</a:t>
+            </a:r>
+          </a:p>
+          <a:p>
+            <a:pPr lvl="1"/>
+            <a:r>
+              <a:rPr lang="en-US" dirty="0"/>
+              <a:t>Resources folder for relevant course and </a:t>
             </a:r>
             <a:r>
               <a:rPr lang="en-US" dirty="0" err="1"/>
-              <a:t>github</a:t>
-            </a:r>
-            <a:r>
-              <a:rPr lang="en-US" dirty="0"/>
-              <a:t> github.com/akiljames83</a:t>
-            </a:r>
-            <a:r>
-              <a:rPr lang="en-US"/>
-              <a:t>/MacAI-2018)</a:t>
-            </a:r>
-            <a:endParaRPr lang="en-US" dirty="0"/>
-          </a:p>
-          <a:p>
-            <a:pPr marL="0" indent="0">
-              <a:buNone/>
-            </a:pPr>
+              <a:t>aritcles</a:t>
+            </a:r>
             <a:endParaRPr lang="en-US" dirty="0"/>
           </a:p>
         </p:txBody>

</xml_diff>